<commit_message>
Further information in presentation
</commit_message>
<xml_diff>
--- a/Abstract_Factory.pptx
+++ b/Abstract_Factory.pptx
@@ -5,28 +5,33 @@
     <p:sldMasterId id="2147483657" r:id="rId1"/>
   </p:sldMasterIdLst>
   <p:notesMasterIdLst>
-    <p:notesMasterId r:id="rId11"/>
+    <p:notesMasterId r:id="rId16"/>
   </p:notesMasterIdLst>
   <p:sldIdLst>
     <p:sldId id="256" r:id="rId2"/>
     <p:sldId id="284" r:id="rId3"/>
-    <p:sldId id="286" r:id="rId4"/>
-    <p:sldId id="288" r:id="rId5"/>
-    <p:sldId id="289" r:id="rId6"/>
-    <p:sldId id="291" r:id="rId7"/>
-    <p:sldId id="287" r:id="rId8"/>
-    <p:sldId id="292" r:id="rId9"/>
-    <p:sldId id="290" r:id="rId10"/>
+    <p:sldId id="294" r:id="rId4"/>
+    <p:sldId id="297" r:id="rId5"/>
+    <p:sldId id="295" r:id="rId6"/>
+    <p:sldId id="293" r:id="rId7"/>
+    <p:sldId id="288" r:id="rId8"/>
+    <p:sldId id="289" r:id="rId9"/>
+    <p:sldId id="286" r:id="rId10"/>
+    <p:sldId id="291" r:id="rId11"/>
+    <p:sldId id="296" r:id="rId12"/>
+    <p:sldId id="287" r:id="rId13"/>
+    <p:sldId id="292" r:id="rId14"/>
+    <p:sldId id="290" r:id="rId15"/>
   </p:sldIdLst>
   <p:sldSz cx="9144000" cy="6858000" type="screen4x3"/>
   <p:notesSz cx="6858000" cy="9144000"/>
   <p:embeddedFontLst>
     <p:embeddedFont>
       <p:font typeface="Cousine" panose="020B0604020202020204" charset="0"/>
-      <p:regular r:id="rId12"/>
-      <p:bold r:id="rId13"/>
-      <p:italic r:id="rId14"/>
-      <p:boldItalic r:id="rId15"/>
+      <p:regular r:id="rId17"/>
+      <p:bold r:id="rId18"/>
+      <p:italic r:id="rId19"/>
+      <p:boldItalic r:id="rId20"/>
     </p:embeddedFont>
   </p:embeddedFontLst>
   <p:defaultTextStyle>
@@ -3018,6 +3023,13 @@
               <a:rPr lang="de-AT" dirty="0"/>
               <a:t>Abstract Factory</a:t>
             </a:r>
+            <a:br>
+              <a:rPr lang="de-AT" dirty="0"/>
+            </a:br>
+            <a:r>
+              <a:rPr lang="de-AT" dirty="0"/>
+              <a:t>Kit</a:t>
+            </a:r>
             <a:endParaRPr dirty="0"/>
           </a:p>
         </p:txBody>
@@ -3030,628 +3042,7 @@
 </p:sld>
 </file>
 
-<file path=ppt/slides/slide2.xml><?xml version="1.0" encoding="utf-8"?>
-<p:sld xmlns:a="http://schemas.openxmlformats.org/drawingml/2006/main" xmlns:r="http://schemas.openxmlformats.org/officeDocument/2006/relationships" xmlns:p="http://schemas.openxmlformats.org/presentationml/2006/main">
-  <p:cSld>
-    <p:spTree>
-      <p:nvGrpSpPr>
-        <p:cNvPr id="1" name=""/>
-        <p:cNvGrpSpPr/>
-        <p:nvPr/>
-      </p:nvGrpSpPr>
-      <p:grpSpPr>
-        <a:xfrm>
-          <a:off x="0" y="0"/>
-          <a:ext cx="0" cy="0"/>
-          <a:chOff x="0" y="0"/>
-          <a:chExt cx="0" cy="0"/>
-        </a:xfrm>
-      </p:grpSpPr>
-      <p:sp>
-        <p:nvSpPr>
-          <p:cNvPr id="5" name="Titel 4">
-            <a:extLst>
-              <a:ext uri="{FF2B5EF4-FFF2-40B4-BE49-F238E27FC236}">
-                <a16:creationId xmlns:a16="http://schemas.microsoft.com/office/drawing/2014/main" id="{01691F79-2D22-425E-8D8C-D36FC05DEDD5}"/>
-              </a:ext>
-            </a:extLst>
-          </p:cNvPr>
-          <p:cNvSpPr>
-            <a:spLocks noGrp="1"/>
-          </p:cNvSpPr>
-          <p:nvPr>
-            <p:ph type="title"/>
-          </p:nvPr>
-        </p:nvSpPr>
-        <p:spPr/>
-        <p:txBody>
-          <a:bodyPr/>
-          <a:lstStyle/>
-          <a:p>
-            <a:r>
-              <a:rPr lang="de-AT" dirty="0"/>
-              <a:t>Allgemeines</a:t>
-            </a:r>
-          </a:p>
-        </p:txBody>
-      </p:sp>
-      <p:sp>
-        <p:nvSpPr>
-          <p:cNvPr id="6" name="Textplatzhalter 5">
-            <a:extLst>
-              <a:ext uri="{FF2B5EF4-FFF2-40B4-BE49-F238E27FC236}">
-                <a16:creationId xmlns:a16="http://schemas.microsoft.com/office/drawing/2014/main" id="{22D90C30-CA8C-4DBB-B23A-E67CB3F5954F}"/>
-              </a:ext>
-            </a:extLst>
-          </p:cNvPr>
-          <p:cNvSpPr>
-            <a:spLocks noGrp="1"/>
-          </p:cNvSpPr>
-          <p:nvPr>
-            <p:ph type="body" idx="1"/>
-          </p:nvPr>
-        </p:nvSpPr>
-        <p:spPr/>
-        <p:txBody>
-          <a:bodyPr/>
-          <a:lstStyle/>
-          <a:p>
-            <a:r>
-              <a:rPr lang="de-AT" dirty="0"/>
-              <a:t>Schnittstelle zur Erzeugung von Objekten</a:t>
-            </a:r>
-          </a:p>
-          <a:p>
-            <a:r>
-              <a:rPr lang="de-AT" dirty="0"/>
-              <a:t>Konkrete Klassen zur Erzeugung werden nicht näher festgelegt</a:t>
-            </a:r>
-          </a:p>
-          <a:p>
-            <a:r>
-              <a:rPr lang="de-AT" dirty="0"/>
-              <a:t>Wird auch als „Factory </a:t>
-            </a:r>
-            <a:r>
-              <a:rPr lang="de-AT" dirty="0" err="1"/>
-              <a:t>of</a:t>
-            </a:r>
-            <a:r>
-              <a:rPr lang="de-AT" dirty="0"/>
-              <a:t> </a:t>
-            </a:r>
-            <a:r>
-              <a:rPr lang="de-AT" dirty="0" err="1"/>
-              <a:t>Factories</a:t>
-            </a:r>
-            <a:r>
-              <a:rPr lang="de-AT" dirty="0"/>
-              <a:t>“ bezeichnet</a:t>
-            </a:r>
-          </a:p>
-          <a:p>
-            <a:pPr lvl="1"/>
-            <a:r>
-              <a:rPr lang="de-AT" dirty="0"/>
-              <a:t>Abstract Factory erzeugt Factory, die dann das Objekt erzeugt</a:t>
-            </a:r>
-          </a:p>
-        </p:txBody>
-      </p:sp>
-      <p:sp>
-        <p:nvSpPr>
-          <p:cNvPr id="4" name="Foliennummernplatzhalter 3">
-            <a:extLst>
-              <a:ext uri="{FF2B5EF4-FFF2-40B4-BE49-F238E27FC236}">
-                <a16:creationId xmlns:a16="http://schemas.microsoft.com/office/drawing/2014/main" id="{A8F83D43-FD5C-4F2D-A22D-82EA0CA5E052}"/>
-              </a:ext>
-            </a:extLst>
-          </p:cNvPr>
-          <p:cNvSpPr>
-            <a:spLocks noGrp="1"/>
-          </p:cNvSpPr>
-          <p:nvPr>
-            <p:ph type="sldNum" idx="12"/>
-          </p:nvPr>
-        </p:nvSpPr>
-        <p:spPr/>
-        <p:txBody>
-          <a:bodyPr/>
-          <a:lstStyle/>
-          <a:p>
-            <a:pPr marL="0" lvl="0" indent="0" algn="r" rtl="0">
-              <a:spcBef>
-                <a:spcPts val="0"/>
-              </a:spcBef>
-              <a:spcAft>
-                <a:spcPts val="0"/>
-              </a:spcAft>
-              <a:buNone/>
-            </a:pPr>
-            <a:fld id="{00000000-1234-1234-1234-123412341234}" type="slidenum">
-              <a:rPr lang="de-AT" smtClean="0"/>
-              <a:t>2</a:t>
-            </a:fld>
-            <a:endParaRPr lang="de-AT"/>
-          </a:p>
-        </p:txBody>
-      </p:sp>
-    </p:spTree>
-    <p:extLst>
-      <p:ext uri="{BB962C8B-B14F-4D97-AF65-F5344CB8AC3E}">
-        <p14:creationId xmlns:p14="http://schemas.microsoft.com/office/powerpoint/2010/main" val="1469461542"/>
-      </p:ext>
-    </p:extLst>
-  </p:cSld>
-  <p:clrMapOvr>
-    <a:masterClrMapping/>
-  </p:clrMapOvr>
-</p:sld>
-</file>
-
-<file path=ppt/slides/slide3.xml><?xml version="1.0" encoding="utf-8"?>
-<p:sld xmlns:a="http://schemas.openxmlformats.org/drawingml/2006/main" xmlns:r="http://schemas.openxmlformats.org/officeDocument/2006/relationships" xmlns:p="http://schemas.openxmlformats.org/presentationml/2006/main">
-  <p:cSld>
-    <p:spTree>
-      <p:nvGrpSpPr>
-        <p:cNvPr id="1" name=""/>
-        <p:cNvGrpSpPr/>
-        <p:nvPr/>
-      </p:nvGrpSpPr>
-      <p:grpSpPr>
-        <a:xfrm>
-          <a:off x="0" y="0"/>
-          <a:ext cx="0" cy="0"/>
-          <a:chOff x="0" y="0"/>
-          <a:chExt cx="0" cy="0"/>
-        </a:xfrm>
-      </p:grpSpPr>
-      <p:sp>
-        <p:nvSpPr>
-          <p:cNvPr id="2" name="Titel 1">
-            <a:extLst>
-              <a:ext uri="{FF2B5EF4-FFF2-40B4-BE49-F238E27FC236}">
-                <a16:creationId xmlns:a16="http://schemas.microsoft.com/office/drawing/2014/main" id="{D41FDE6F-1199-4939-A35E-221AD97B2904}"/>
-              </a:ext>
-            </a:extLst>
-          </p:cNvPr>
-          <p:cNvSpPr>
-            <a:spLocks noGrp="1"/>
-          </p:cNvSpPr>
-          <p:nvPr>
-            <p:ph type="title"/>
-          </p:nvPr>
-        </p:nvSpPr>
-        <p:spPr/>
-        <p:txBody>
-          <a:bodyPr/>
-          <a:lstStyle/>
-          <a:p>
-            <a:r>
-              <a:rPr lang="de-AT" dirty="0"/>
-              <a:t>Unterschied Factory – Abstract Factory</a:t>
-            </a:r>
-          </a:p>
-        </p:txBody>
-      </p:sp>
-      <p:sp>
-        <p:nvSpPr>
-          <p:cNvPr id="3" name="Textplatzhalter 2">
-            <a:extLst>
-              <a:ext uri="{FF2B5EF4-FFF2-40B4-BE49-F238E27FC236}">
-                <a16:creationId xmlns:a16="http://schemas.microsoft.com/office/drawing/2014/main" id="{DDB95B27-E905-4254-A544-863FCDEB7951}"/>
-              </a:ext>
-            </a:extLst>
-          </p:cNvPr>
-          <p:cNvSpPr>
-            <a:spLocks noGrp="1"/>
-          </p:cNvSpPr>
-          <p:nvPr>
-            <p:ph type="body" idx="1"/>
-          </p:nvPr>
-        </p:nvSpPr>
-        <p:spPr/>
-        <p:txBody>
-          <a:bodyPr/>
-          <a:lstStyle/>
-          <a:p>
-            <a:r>
-              <a:rPr lang="de-AT" sz="2000" dirty="0"/>
-              <a:t>Factory Methode &lt;-&gt; Abstract Factory Klasse</a:t>
-            </a:r>
-          </a:p>
-          <a:p>
-            <a:r>
-              <a:rPr lang="de-AT" sz="2000" dirty="0"/>
-              <a:t>Factory Methode kann von Subklassen überschrieben werden</a:t>
-            </a:r>
-          </a:p>
-          <a:p>
-            <a:r>
-              <a:rPr lang="de-AT" sz="2000" dirty="0"/>
-              <a:t>Abstract Factory überträgt Verantwortung der Objektinitialisierung an Subklassen</a:t>
-            </a:r>
-          </a:p>
-          <a:p>
-            <a:endParaRPr lang="de-AT" sz="2000" dirty="0"/>
-          </a:p>
-          <a:p>
-            <a:endParaRPr lang="de-AT" dirty="0"/>
-          </a:p>
-          <a:p>
-            <a:endParaRPr lang="de-AT" dirty="0"/>
-          </a:p>
-        </p:txBody>
-      </p:sp>
-      <p:sp>
-        <p:nvSpPr>
-          <p:cNvPr id="4" name="Foliennummernplatzhalter 3">
-            <a:extLst>
-              <a:ext uri="{FF2B5EF4-FFF2-40B4-BE49-F238E27FC236}">
-                <a16:creationId xmlns:a16="http://schemas.microsoft.com/office/drawing/2014/main" id="{1497F17A-C212-465A-825C-43FF334B66D9}"/>
-              </a:ext>
-            </a:extLst>
-          </p:cNvPr>
-          <p:cNvSpPr>
-            <a:spLocks noGrp="1"/>
-          </p:cNvSpPr>
-          <p:nvPr>
-            <p:ph type="sldNum" idx="12"/>
-          </p:nvPr>
-        </p:nvSpPr>
-        <p:spPr/>
-        <p:txBody>
-          <a:bodyPr/>
-          <a:lstStyle/>
-          <a:p>
-            <a:pPr marL="0" lvl="0" indent="0" algn="r" rtl="0">
-              <a:spcBef>
-                <a:spcPts val="0"/>
-              </a:spcBef>
-              <a:spcAft>
-                <a:spcPts val="0"/>
-              </a:spcAft>
-              <a:buNone/>
-            </a:pPr>
-            <a:fld id="{00000000-1234-1234-1234-123412341234}" type="slidenum">
-              <a:rPr lang="de-AT" smtClean="0"/>
-              <a:t>3</a:t>
-            </a:fld>
-            <a:endParaRPr lang="de-AT"/>
-          </a:p>
-        </p:txBody>
-      </p:sp>
-    </p:spTree>
-    <p:extLst>
-      <p:ext uri="{BB962C8B-B14F-4D97-AF65-F5344CB8AC3E}">
-        <p14:creationId xmlns:p14="http://schemas.microsoft.com/office/powerpoint/2010/main" val="310389490"/>
-      </p:ext>
-    </p:extLst>
-  </p:cSld>
-  <p:clrMapOvr>
-    <a:masterClrMapping/>
-  </p:clrMapOvr>
-</p:sld>
-</file>
-
-<file path=ppt/slides/slide4.xml><?xml version="1.0" encoding="utf-8"?>
-<p:sld xmlns:a="http://schemas.openxmlformats.org/drawingml/2006/main" xmlns:r="http://schemas.openxmlformats.org/officeDocument/2006/relationships" xmlns:p="http://schemas.openxmlformats.org/presentationml/2006/main">
-  <p:cSld>
-    <p:spTree>
-      <p:nvGrpSpPr>
-        <p:cNvPr id="1" name=""/>
-        <p:cNvGrpSpPr/>
-        <p:nvPr/>
-      </p:nvGrpSpPr>
-      <p:grpSpPr>
-        <a:xfrm>
-          <a:off x="0" y="0"/>
-          <a:ext cx="0" cy="0"/>
-          <a:chOff x="0" y="0"/>
-          <a:chExt cx="0" cy="0"/>
-        </a:xfrm>
-      </p:grpSpPr>
-      <p:sp>
-        <p:nvSpPr>
-          <p:cNvPr id="2" name="Titel 1">
-            <a:extLst>
-              <a:ext uri="{FF2B5EF4-FFF2-40B4-BE49-F238E27FC236}">
-                <a16:creationId xmlns:a16="http://schemas.microsoft.com/office/drawing/2014/main" id="{7B49886A-DBF8-4690-989A-AC6DC97DB377}"/>
-              </a:ext>
-            </a:extLst>
-          </p:cNvPr>
-          <p:cNvSpPr>
-            <a:spLocks noGrp="1"/>
-          </p:cNvSpPr>
-          <p:nvPr>
-            <p:ph type="title"/>
-          </p:nvPr>
-        </p:nvSpPr>
-        <p:spPr/>
-        <p:txBody>
-          <a:bodyPr/>
-          <a:lstStyle/>
-          <a:p>
-            <a:r>
-              <a:rPr lang="de-AT" dirty="0"/>
-              <a:t>Vorteile</a:t>
-            </a:r>
-          </a:p>
-        </p:txBody>
-      </p:sp>
-      <p:sp>
-        <p:nvSpPr>
-          <p:cNvPr id="3" name="Textplatzhalter 2">
-            <a:extLst>
-              <a:ext uri="{FF2B5EF4-FFF2-40B4-BE49-F238E27FC236}">
-                <a16:creationId xmlns:a16="http://schemas.microsoft.com/office/drawing/2014/main" id="{D8D7EF8A-8ECD-4E2A-970B-5A44EF7B8AD4}"/>
-              </a:ext>
-            </a:extLst>
-          </p:cNvPr>
-          <p:cNvSpPr>
-            <a:spLocks noGrp="1"/>
-          </p:cNvSpPr>
-          <p:nvPr>
-            <p:ph type="body" idx="1"/>
-          </p:nvPr>
-        </p:nvSpPr>
-        <p:spPr/>
-        <p:txBody>
-          <a:bodyPr/>
-          <a:lstStyle/>
-          <a:p>
-            <a:r>
-              <a:rPr lang="de-AT" dirty="0"/>
-              <a:t>Isolation der konkreten Klassen</a:t>
-            </a:r>
-          </a:p>
-          <a:p>
-            <a:pPr lvl="1"/>
-            <a:r>
-              <a:rPr lang="de-AT" dirty="0"/>
-              <a:t>Client überlässt Erstellung der Objekte der Factory</a:t>
-            </a:r>
-          </a:p>
-          <a:p>
-            <a:r>
-              <a:rPr lang="de-AT" dirty="0"/>
-              <a:t>Objekte können einfach ausgetauscht werden</a:t>
-            </a:r>
-          </a:p>
-          <a:p>
-            <a:pPr lvl="1"/>
-            <a:r>
-              <a:rPr lang="de-AT" dirty="0"/>
-              <a:t>Einfaches Tauschen der konkreten Factory</a:t>
-            </a:r>
-          </a:p>
-          <a:p>
-            <a:r>
-              <a:rPr lang="de-AT" dirty="0"/>
-              <a:t>Konsistenz der Objekte</a:t>
-            </a:r>
-          </a:p>
-          <a:p>
-            <a:pPr lvl="1"/>
-            <a:r>
-              <a:rPr lang="de-AT" dirty="0"/>
-              <a:t>Objekte der Factory sind so </a:t>
-            </a:r>
-            <a:r>
-              <a:rPr lang="de-AT" dirty="0" err="1"/>
-              <a:t>designed</a:t>
-            </a:r>
-            <a:r>
-              <a:rPr lang="de-AT" dirty="0"/>
-              <a:t>, um zusammenarbeiten zu können</a:t>
-            </a:r>
-          </a:p>
-        </p:txBody>
-      </p:sp>
-      <p:sp>
-        <p:nvSpPr>
-          <p:cNvPr id="4" name="Foliennummernplatzhalter 3">
-            <a:extLst>
-              <a:ext uri="{FF2B5EF4-FFF2-40B4-BE49-F238E27FC236}">
-                <a16:creationId xmlns:a16="http://schemas.microsoft.com/office/drawing/2014/main" id="{D8C10F95-DA02-4C33-AF21-D762AFC5142E}"/>
-              </a:ext>
-            </a:extLst>
-          </p:cNvPr>
-          <p:cNvSpPr>
-            <a:spLocks noGrp="1"/>
-          </p:cNvSpPr>
-          <p:nvPr>
-            <p:ph type="sldNum" idx="12"/>
-          </p:nvPr>
-        </p:nvSpPr>
-        <p:spPr/>
-        <p:txBody>
-          <a:bodyPr/>
-          <a:lstStyle/>
-          <a:p>
-            <a:pPr marL="0" lvl="0" indent="0" algn="r" rtl="0">
-              <a:spcBef>
-                <a:spcPts val="0"/>
-              </a:spcBef>
-              <a:spcAft>
-                <a:spcPts val="0"/>
-              </a:spcAft>
-              <a:buNone/>
-            </a:pPr>
-            <a:fld id="{00000000-1234-1234-1234-123412341234}" type="slidenum">
-              <a:rPr lang="de-AT" smtClean="0"/>
-              <a:t>4</a:t>
-            </a:fld>
-            <a:endParaRPr lang="de-AT"/>
-          </a:p>
-        </p:txBody>
-      </p:sp>
-    </p:spTree>
-    <p:extLst>
-      <p:ext uri="{BB962C8B-B14F-4D97-AF65-F5344CB8AC3E}">
-        <p14:creationId xmlns:p14="http://schemas.microsoft.com/office/powerpoint/2010/main" val="1415051504"/>
-      </p:ext>
-    </p:extLst>
-  </p:cSld>
-  <p:clrMapOvr>
-    <a:masterClrMapping/>
-  </p:clrMapOvr>
-</p:sld>
-</file>
-
-<file path=ppt/slides/slide5.xml><?xml version="1.0" encoding="utf-8"?>
-<p:sld xmlns:a="http://schemas.openxmlformats.org/drawingml/2006/main" xmlns:r="http://schemas.openxmlformats.org/officeDocument/2006/relationships" xmlns:p="http://schemas.openxmlformats.org/presentationml/2006/main">
-  <p:cSld>
-    <p:spTree>
-      <p:nvGrpSpPr>
-        <p:cNvPr id="1" name=""/>
-        <p:cNvGrpSpPr/>
-        <p:nvPr/>
-      </p:nvGrpSpPr>
-      <p:grpSpPr>
-        <a:xfrm>
-          <a:off x="0" y="0"/>
-          <a:ext cx="0" cy="0"/>
-          <a:chOff x="0" y="0"/>
-          <a:chExt cx="0" cy="0"/>
-        </a:xfrm>
-      </p:grpSpPr>
-      <p:sp>
-        <p:nvSpPr>
-          <p:cNvPr id="2" name="Titel 1">
-            <a:extLst>
-              <a:ext uri="{FF2B5EF4-FFF2-40B4-BE49-F238E27FC236}">
-                <a16:creationId xmlns:a16="http://schemas.microsoft.com/office/drawing/2014/main" id="{1266ED8F-9FD1-4B15-A50E-C6F18D83F3DC}"/>
-              </a:ext>
-            </a:extLst>
-          </p:cNvPr>
-          <p:cNvSpPr>
-            <a:spLocks noGrp="1"/>
-          </p:cNvSpPr>
-          <p:nvPr>
-            <p:ph type="title"/>
-          </p:nvPr>
-        </p:nvSpPr>
-        <p:spPr/>
-        <p:txBody>
-          <a:bodyPr/>
-          <a:lstStyle/>
-          <a:p>
-            <a:r>
-              <a:rPr lang="de-AT" dirty="0"/>
-              <a:t>Nachteil</a:t>
-            </a:r>
-          </a:p>
-        </p:txBody>
-      </p:sp>
-      <p:sp>
-        <p:nvSpPr>
-          <p:cNvPr id="3" name="Textplatzhalter 2">
-            <a:extLst>
-              <a:ext uri="{FF2B5EF4-FFF2-40B4-BE49-F238E27FC236}">
-                <a16:creationId xmlns:a16="http://schemas.microsoft.com/office/drawing/2014/main" id="{DFA52D6C-B921-4B1B-9E4C-1FE88A947AF5}"/>
-              </a:ext>
-            </a:extLst>
-          </p:cNvPr>
-          <p:cNvSpPr>
-            <a:spLocks noGrp="1"/>
-          </p:cNvSpPr>
-          <p:nvPr>
-            <p:ph type="body" idx="1"/>
-          </p:nvPr>
-        </p:nvSpPr>
-        <p:spPr/>
-        <p:txBody>
-          <a:bodyPr/>
-          <a:lstStyle/>
-          <a:p>
-            <a:r>
-              <a:rPr lang="de-AT" dirty="0"/>
-              <a:t>Erweiterbarkeit schwierig</a:t>
-            </a:r>
-          </a:p>
-          <a:p>
-            <a:pPr lvl="1"/>
-            <a:r>
-              <a:rPr lang="de-AT" dirty="0"/>
-              <a:t>Anpassung von</a:t>
-            </a:r>
-          </a:p>
-          <a:p>
-            <a:pPr lvl="2"/>
-            <a:r>
-              <a:rPr lang="de-AT" dirty="0"/>
-              <a:t>Abstract Factory</a:t>
-            </a:r>
-          </a:p>
-          <a:p>
-            <a:pPr lvl="2"/>
-            <a:r>
-              <a:rPr lang="de-AT" dirty="0"/>
-              <a:t>Interface</a:t>
-            </a:r>
-          </a:p>
-          <a:p>
-            <a:pPr lvl="2"/>
-            <a:r>
-              <a:rPr lang="de-AT" dirty="0"/>
-              <a:t>Subklassen</a:t>
-            </a:r>
-          </a:p>
-        </p:txBody>
-      </p:sp>
-      <p:sp>
-        <p:nvSpPr>
-          <p:cNvPr id="4" name="Foliennummernplatzhalter 3">
-            <a:extLst>
-              <a:ext uri="{FF2B5EF4-FFF2-40B4-BE49-F238E27FC236}">
-                <a16:creationId xmlns:a16="http://schemas.microsoft.com/office/drawing/2014/main" id="{F77D36DB-8BF3-4723-816E-08B35346E047}"/>
-              </a:ext>
-            </a:extLst>
-          </p:cNvPr>
-          <p:cNvSpPr>
-            <a:spLocks noGrp="1"/>
-          </p:cNvSpPr>
-          <p:nvPr>
-            <p:ph type="sldNum" idx="12"/>
-          </p:nvPr>
-        </p:nvSpPr>
-        <p:spPr/>
-        <p:txBody>
-          <a:bodyPr/>
-          <a:lstStyle/>
-          <a:p>
-            <a:pPr marL="0" lvl="0" indent="0" algn="r" rtl="0">
-              <a:spcBef>
-                <a:spcPts val="0"/>
-              </a:spcBef>
-              <a:spcAft>
-                <a:spcPts val="0"/>
-              </a:spcAft>
-              <a:buNone/>
-            </a:pPr>
-            <a:fld id="{00000000-1234-1234-1234-123412341234}" type="slidenum">
-              <a:rPr lang="de-AT" smtClean="0"/>
-              <a:t>5</a:t>
-            </a:fld>
-            <a:endParaRPr lang="de-AT"/>
-          </a:p>
-        </p:txBody>
-      </p:sp>
-    </p:spTree>
-    <p:extLst>
-      <p:ext uri="{BB962C8B-B14F-4D97-AF65-F5344CB8AC3E}">
-        <p14:creationId xmlns:p14="http://schemas.microsoft.com/office/powerpoint/2010/main" val="471742731"/>
-      </p:ext>
-    </p:extLst>
-  </p:cSld>
-  <p:clrMapOvr>
-    <a:masterClrMapping/>
-  </p:clrMapOvr>
-</p:sld>
-</file>
-
-<file path=ppt/slides/slide6.xml><?xml version="1.0" encoding="utf-8"?>
+<file path=ppt/slides/slide10.xml><?xml version="1.0" encoding="utf-8"?>
 <p:sld xmlns:a="http://schemas.openxmlformats.org/drawingml/2006/main" xmlns:r="http://schemas.openxmlformats.org/officeDocument/2006/relationships" xmlns:p="http://schemas.openxmlformats.org/presentationml/2006/main">
   <p:cSld>
     <p:spTree>
@@ -3815,7 +3206,7 @@
             </a:pPr>
             <a:fld id="{00000000-1234-1234-1234-123412341234}" type="slidenum">
               <a:rPr lang="de-AT" smtClean="0"/>
-              <a:t>6</a:t>
+              <a:t>10</a:t>
             </a:fld>
             <a:endParaRPr lang="de-AT"/>
           </a:p>
@@ -3834,7 +3225,128 @@
 </p:sld>
 </file>
 
-<file path=ppt/slides/slide7.xml><?xml version="1.0" encoding="utf-8"?>
+<file path=ppt/slides/slide11.xml><?xml version="1.0" encoding="utf-8"?>
+<p:sld xmlns:a="http://schemas.openxmlformats.org/drawingml/2006/main" xmlns:r="http://schemas.openxmlformats.org/officeDocument/2006/relationships" xmlns:p="http://schemas.openxmlformats.org/presentationml/2006/main">
+  <p:cSld>
+    <p:spTree>
+      <p:nvGrpSpPr>
+        <p:cNvPr id="1" name=""/>
+        <p:cNvGrpSpPr/>
+        <p:nvPr/>
+      </p:nvGrpSpPr>
+      <p:grpSpPr>
+        <a:xfrm>
+          <a:off x="0" y="0"/>
+          <a:ext cx="0" cy="0"/>
+          <a:chOff x="0" y="0"/>
+          <a:chExt cx="0" cy="0"/>
+        </a:xfrm>
+      </p:grpSpPr>
+      <p:sp>
+        <p:nvSpPr>
+          <p:cNvPr id="2" name="Titel 1">
+            <a:extLst>
+              <a:ext uri="{FF2B5EF4-FFF2-40B4-BE49-F238E27FC236}">
+                <a16:creationId xmlns:a16="http://schemas.microsoft.com/office/drawing/2014/main" id="{5492FEB5-0DC3-49BB-954A-E313EBD9FBC6}"/>
+              </a:ext>
+            </a:extLst>
+          </p:cNvPr>
+          <p:cNvSpPr>
+            <a:spLocks noGrp="1"/>
+          </p:cNvSpPr>
+          <p:nvPr>
+            <p:ph type="title"/>
+          </p:nvPr>
+        </p:nvSpPr>
+        <p:spPr/>
+        <p:txBody>
+          <a:bodyPr/>
+          <a:lstStyle/>
+          <a:p>
+            <a:r>
+              <a:rPr lang="de-AT" dirty="0"/>
+              <a:t>Realisierung</a:t>
+            </a:r>
+          </a:p>
+        </p:txBody>
+      </p:sp>
+      <p:sp>
+        <p:nvSpPr>
+          <p:cNvPr id="3" name="Textplatzhalter 2">
+            <a:extLst>
+              <a:ext uri="{FF2B5EF4-FFF2-40B4-BE49-F238E27FC236}">
+                <a16:creationId xmlns:a16="http://schemas.microsoft.com/office/drawing/2014/main" id="{62991C8E-85AC-4229-9793-03F5E9A35834}"/>
+              </a:ext>
+            </a:extLst>
+          </p:cNvPr>
+          <p:cNvSpPr>
+            <a:spLocks noGrp="1"/>
+          </p:cNvSpPr>
+          <p:nvPr>
+            <p:ph type="body" idx="1"/>
+          </p:nvPr>
+        </p:nvSpPr>
+        <p:spPr/>
+        <p:txBody>
+          <a:bodyPr/>
+          <a:lstStyle/>
+          <a:p>
+            <a:endParaRPr lang="de-AT" dirty="0"/>
+          </a:p>
+        </p:txBody>
+      </p:sp>
+      <p:sp>
+        <p:nvSpPr>
+          <p:cNvPr id="4" name="Foliennummernplatzhalter 3">
+            <a:extLst>
+              <a:ext uri="{FF2B5EF4-FFF2-40B4-BE49-F238E27FC236}">
+                <a16:creationId xmlns:a16="http://schemas.microsoft.com/office/drawing/2014/main" id="{BAD268F6-6E4E-4C5A-A446-A2F182CCCE1B}"/>
+              </a:ext>
+            </a:extLst>
+          </p:cNvPr>
+          <p:cNvSpPr>
+            <a:spLocks noGrp="1"/>
+          </p:cNvSpPr>
+          <p:nvPr>
+            <p:ph type="sldNum" idx="12"/>
+          </p:nvPr>
+        </p:nvSpPr>
+        <p:spPr/>
+        <p:txBody>
+          <a:bodyPr/>
+          <a:lstStyle/>
+          <a:p>
+            <a:pPr marL="0" lvl="0" indent="0" algn="r" rtl="0">
+              <a:spcBef>
+                <a:spcPts val="0"/>
+              </a:spcBef>
+              <a:spcAft>
+                <a:spcPts val="0"/>
+              </a:spcAft>
+              <a:buNone/>
+            </a:pPr>
+            <a:fld id="{00000000-1234-1234-1234-123412341234}" type="slidenum">
+              <a:rPr lang="de-AT" smtClean="0"/>
+              <a:t>11</a:t>
+            </a:fld>
+            <a:endParaRPr lang="de-AT"/>
+          </a:p>
+        </p:txBody>
+      </p:sp>
+    </p:spTree>
+    <p:extLst>
+      <p:ext uri="{BB962C8B-B14F-4D97-AF65-F5344CB8AC3E}">
+        <p14:creationId xmlns:p14="http://schemas.microsoft.com/office/powerpoint/2010/main" val="1337730883"/>
+      </p:ext>
+    </p:extLst>
+  </p:cSld>
+  <p:clrMapOvr>
+    <a:masterClrMapping/>
+  </p:clrMapOvr>
+</p:sld>
+</file>
+
+<file path=ppt/slides/slide12.xml><?xml version="1.0" encoding="utf-8"?>
 <p:sld xmlns:a="http://schemas.openxmlformats.org/drawingml/2006/main" xmlns:r="http://schemas.openxmlformats.org/officeDocument/2006/relationships" xmlns:p="http://schemas.openxmlformats.org/presentationml/2006/main">
   <p:cSld>
     <p:spTree>
@@ -3936,7 +3448,7 @@
             </a:pPr>
             <a:fld id="{00000000-1234-1234-1234-123412341234}" type="slidenum">
               <a:rPr lang="de-AT" smtClean="0"/>
-              <a:t>7</a:t>
+              <a:t>12</a:t>
             </a:fld>
             <a:endParaRPr lang="de-AT"/>
           </a:p>
@@ -4002,7 +3514,7 @@
 </p:sld>
 </file>
 
-<file path=ppt/slides/slide8.xml><?xml version="1.0" encoding="utf-8"?>
+<file path=ppt/slides/slide13.xml><?xml version="1.0" encoding="utf-8"?>
 <p:sld xmlns:a="http://schemas.openxmlformats.org/drawingml/2006/main" xmlns:r="http://schemas.openxmlformats.org/officeDocument/2006/relationships" xmlns:p="http://schemas.openxmlformats.org/presentationml/2006/main">
   <p:cSld>
     <p:spTree>
@@ -4170,7 +3682,7 @@
             </a:pPr>
             <a:fld id="{00000000-1234-1234-1234-123412341234}" type="slidenum">
               <a:rPr lang="de-AT" smtClean="0"/>
-              <a:t>8</a:t>
+              <a:t>13</a:t>
             </a:fld>
             <a:endParaRPr lang="de-AT"/>
           </a:p>
@@ -4189,7 +3701,7 @@
 </p:sld>
 </file>
 
-<file path=ppt/slides/slide9.xml><?xml version="1.0" encoding="utf-8"?>
+<file path=ppt/slides/slide14.xml><?xml version="1.0" encoding="utf-8"?>
 <p:sld xmlns:a="http://schemas.openxmlformats.org/drawingml/2006/main" xmlns:r="http://schemas.openxmlformats.org/officeDocument/2006/relationships" xmlns:p="http://schemas.openxmlformats.org/presentationml/2006/main">
   <p:cSld>
     <p:spTree>
@@ -4257,41 +3769,111 @@
           <a:p>
             <a:r>
               <a:rPr lang="de-AT" sz="1600" dirty="0">
-                <a:hlinkClick r:id="rId2"/>
+                <a:solidFill>
+                  <a:schemeClr val="tx1"/>
+                </a:solidFill>
+                <a:hlinkClick r:id="rId2">
+                  <a:extLst>
+                    <a:ext uri="{A12FA001-AC4F-418D-AE19-62706E023703}">
+                      <ahyp:hlinkClr xmlns:ahyp="http://schemas.microsoft.com/office/drawing/2018/hyperlinkcolor" val="tx"/>
+                    </a:ext>
+                  </a:extLst>
+                </a:hlinkClick>
               </a:rPr>
               <a:t>https://www.tutorialspoint.com/design_pattern/abstract_factory_pattern.htm</a:t>
             </a:r>
+            <a:endParaRPr lang="de-AT" sz="1600" dirty="0">
+              <a:solidFill>
+                <a:schemeClr val="tx1"/>
+              </a:solidFill>
+            </a:endParaRPr>
+          </a:p>
+          <a:p>
+            <a:r>
+              <a:rPr lang="de-AT" sz="1600" dirty="0">
+                <a:solidFill>
+                  <a:schemeClr val="tx1"/>
+                </a:solidFill>
+              </a:rPr>
+              <a:t>https://www.philipphauer.de/study/se/design-pattern/abstract-factory.php</a:t>
+            </a:r>
+          </a:p>
+          <a:p>
+            <a:r>
+              <a:rPr lang="de-AT" sz="1600" dirty="0">
+                <a:solidFill>
+                  <a:schemeClr val="tx1"/>
+                </a:solidFill>
+              </a:rPr>
+              <a:t>https://de.wikipedia.org/wiki/Abstrakte_Fabrik</a:t>
+            </a:r>
+          </a:p>
+          <a:p>
+            <a:r>
+              <a:rPr lang="de-AT" sz="1600" dirty="0">
+                <a:solidFill>
+                  <a:schemeClr val="tx1"/>
+                </a:solidFill>
+              </a:rPr>
+              <a:t>https://refactoring.guru/design-patterns/abstract-factory</a:t>
+            </a:r>
+          </a:p>
+          <a:p>
+            <a:r>
+              <a:rPr lang="de-AT" sz="1600" dirty="0">
+                <a:solidFill>
+                  <a:schemeClr val="tx1"/>
+                </a:solidFill>
+              </a:rPr>
+              <a:t>https://www.geeksforgeeks.org/abstract-factory-pattern/</a:t>
+            </a:r>
+          </a:p>
+          <a:p>
+            <a:r>
+              <a:rPr lang="de-AT" sz="1600" dirty="0">
+                <a:solidFill>
+                  <a:schemeClr val="tx1"/>
+                </a:solidFill>
+                <a:hlinkClick r:id="rId3">
+                  <a:extLst>
+                    <a:ext uri="{A12FA001-AC4F-418D-AE19-62706E023703}">
+                      <ahyp:hlinkClr xmlns:ahyp="http://schemas.microsoft.com/office/drawing/2018/hyperlinkcolor" val="tx"/>
+                    </a:ext>
+                  </a:extLst>
+                </a:hlinkClick>
+              </a:rPr>
+              <a:t>https://stackoverflow.com/questions/5739611/differences-between-abstract-factory-pattern-and-factory-method</a:t>
+            </a:r>
+            <a:endParaRPr lang="de-AT" sz="1600" dirty="0">
+              <a:solidFill>
+                <a:schemeClr val="tx1"/>
+              </a:solidFill>
+            </a:endParaRPr>
+          </a:p>
+          <a:p>
+            <a:r>
+              <a:rPr lang="de-AT" sz="1600" dirty="0">
+                <a:solidFill>
+                  <a:schemeClr val="tx1"/>
+                </a:solidFill>
+                <a:hlinkClick r:id="rId4">
+                  <a:extLst>
+                    <a:ext uri="{A12FA001-AC4F-418D-AE19-62706E023703}">
+                      <ahyp:hlinkClr xmlns:ahyp="http://schemas.microsoft.com/office/drawing/2018/hyperlinkcolor" val="tx"/>
+                    </a:ext>
+                  </a:extLst>
+                </a:hlinkClick>
+              </a:rPr>
+              <a:t>https://www.quora.com/What-are-the-pros-and-cons-of-the-factory-design-pattern</a:t>
+            </a:r>
+            <a:endParaRPr lang="de-AT" sz="1600" dirty="0">
+              <a:solidFill>
+                <a:schemeClr val="tx1"/>
+              </a:solidFill>
+            </a:endParaRPr>
+          </a:p>
+          <a:p>
             <a:endParaRPr lang="de-AT" sz="1600" dirty="0"/>
-          </a:p>
-          <a:p>
-            <a:r>
-              <a:rPr lang="de-AT" sz="1600" dirty="0"/>
-              <a:t>https://www.philipphauer.de/study/se/design-pattern/abstract-factory.php</a:t>
-            </a:r>
-          </a:p>
-          <a:p>
-            <a:r>
-              <a:rPr lang="de-AT" sz="1600" dirty="0"/>
-              <a:t>https://de.wikipedia.org/wiki/Abstrakte_Fabrik</a:t>
-            </a:r>
-          </a:p>
-          <a:p>
-            <a:r>
-              <a:rPr lang="de-AT" sz="1600" dirty="0"/>
-              <a:t>https://refactoring.guru/design-patterns/abstract-factory</a:t>
-            </a:r>
-          </a:p>
-          <a:p>
-            <a:r>
-              <a:rPr lang="de-AT" sz="1600" dirty="0"/>
-              <a:t>https://www.geeksforgeeks.org/abstract-factory-pattern/</a:t>
-            </a:r>
-          </a:p>
-          <a:p>
-            <a:r>
-              <a:rPr lang="de-AT" sz="1600" dirty="0"/>
-              <a:t>https://stackoverflow.com/questions/5739611/differences-between-abstract-factory-pattern-and-factory-method</a:t>
-            </a:r>
           </a:p>
         </p:txBody>
       </p:sp>
@@ -4327,7 +3909,7 @@
             </a:pPr>
             <a:fld id="{00000000-1234-1234-1234-123412341234}" type="slidenum">
               <a:rPr lang="de-AT" smtClean="0"/>
-              <a:t>9</a:t>
+              <a:t>14</a:t>
             </a:fld>
             <a:endParaRPr lang="de-AT"/>
           </a:p>
@@ -4337,6 +3919,1297 @@
     <p:extLst>
       <p:ext uri="{BB962C8B-B14F-4D97-AF65-F5344CB8AC3E}">
         <p14:creationId xmlns:p14="http://schemas.microsoft.com/office/powerpoint/2010/main" val="949240565"/>
+      </p:ext>
+    </p:extLst>
+  </p:cSld>
+  <p:clrMapOvr>
+    <a:masterClrMapping/>
+  </p:clrMapOvr>
+</p:sld>
+</file>
+
+<file path=ppt/slides/slide2.xml><?xml version="1.0" encoding="utf-8"?>
+<p:sld xmlns:a="http://schemas.openxmlformats.org/drawingml/2006/main" xmlns:r="http://schemas.openxmlformats.org/officeDocument/2006/relationships" xmlns:p="http://schemas.openxmlformats.org/presentationml/2006/main">
+  <p:cSld>
+    <p:spTree>
+      <p:nvGrpSpPr>
+        <p:cNvPr id="1" name=""/>
+        <p:cNvGrpSpPr/>
+        <p:nvPr/>
+      </p:nvGrpSpPr>
+      <p:grpSpPr>
+        <a:xfrm>
+          <a:off x="0" y="0"/>
+          <a:ext cx="0" cy="0"/>
+          <a:chOff x="0" y="0"/>
+          <a:chExt cx="0" cy="0"/>
+        </a:xfrm>
+      </p:grpSpPr>
+      <p:sp>
+        <p:nvSpPr>
+          <p:cNvPr id="5" name="Titel 4">
+            <a:extLst>
+              <a:ext uri="{FF2B5EF4-FFF2-40B4-BE49-F238E27FC236}">
+                <a16:creationId xmlns:a16="http://schemas.microsoft.com/office/drawing/2014/main" id="{01691F79-2D22-425E-8D8C-D36FC05DEDD5}"/>
+              </a:ext>
+            </a:extLst>
+          </p:cNvPr>
+          <p:cNvSpPr>
+            <a:spLocks noGrp="1"/>
+          </p:cNvSpPr>
+          <p:nvPr>
+            <p:ph type="title"/>
+          </p:nvPr>
+        </p:nvSpPr>
+        <p:spPr/>
+        <p:txBody>
+          <a:bodyPr/>
+          <a:lstStyle/>
+          <a:p>
+            <a:r>
+              <a:rPr lang="de-AT" dirty="0"/>
+              <a:t>Allgemeines</a:t>
+            </a:r>
+          </a:p>
+        </p:txBody>
+      </p:sp>
+      <p:sp>
+        <p:nvSpPr>
+          <p:cNvPr id="6" name="Textplatzhalter 5">
+            <a:extLst>
+              <a:ext uri="{FF2B5EF4-FFF2-40B4-BE49-F238E27FC236}">
+                <a16:creationId xmlns:a16="http://schemas.microsoft.com/office/drawing/2014/main" id="{22D90C30-CA8C-4DBB-B23A-E67CB3F5954F}"/>
+              </a:ext>
+            </a:extLst>
+          </p:cNvPr>
+          <p:cNvSpPr>
+            <a:spLocks noGrp="1"/>
+          </p:cNvSpPr>
+          <p:nvPr>
+            <p:ph type="body" idx="1"/>
+          </p:nvPr>
+        </p:nvSpPr>
+        <p:spPr/>
+        <p:txBody>
+          <a:bodyPr/>
+          <a:lstStyle/>
+          <a:p>
+            <a:r>
+              <a:rPr lang="de-AT" dirty="0"/>
+              <a:t>Schnittstelle zur Erzeugung von Objekten</a:t>
+            </a:r>
+          </a:p>
+          <a:p>
+            <a:r>
+              <a:rPr lang="de-AT" dirty="0"/>
+              <a:t>Konkrete Klassen zur Erzeugung werden nicht näher festgelegt</a:t>
+            </a:r>
+          </a:p>
+          <a:p>
+            <a:r>
+              <a:rPr lang="de-AT" dirty="0"/>
+              <a:t>Wird auch als „Factory </a:t>
+            </a:r>
+            <a:r>
+              <a:rPr lang="de-AT" dirty="0" err="1"/>
+              <a:t>of</a:t>
+            </a:r>
+            <a:r>
+              <a:rPr lang="de-AT" dirty="0"/>
+              <a:t> </a:t>
+            </a:r>
+            <a:r>
+              <a:rPr lang="de-AT" dirty="0" err="1"/>
+              <a:t>Factories</a:t>
+            </a:r>
+            <a:r>
+              <a:rPr lang="de-AT" dirty="0"/>
+              <a:t>“ bezeichnet</a:t>
+            </a:r>
+          </a:p>
+          <a:p>
+            <a:pPr lvl="1"/>
+            <a:r>
+              <a:rPr lang="de-AT" dirty="0"/>
+              <a:t>Abstract Factory erzeugt Factory, die dann das Objekt erzeugt</a:t>
+            </a:r>
+          </a:p>
+          <a:p>
+            <a:r>
+              <a:rPr lang="de-AT" dirty="0"/>
+              <a:t>Ist ein Erzeugungsmuster</a:t>
+            </a:r>
+          </a:p>
+        </p:txBody>
+      </p:sp>
+      <p:sp>
+        <p:nvSpPr>
+          <p:cNvPr id="4" name="Foliennummernplatzhalter 3">
+            <a:extLst>
+              <a:ext uri="{FF2B5EF4-FFF2-40B4-BE49-F238E27FC236}">
+                <a16:creationId xmlns:a16="http://schemas.microsoft.com/office/drawing/2014/main" id="{A8F83D43-FD5C-4F2D-A22D-82EA0CA5E052}"/>
+              </a:ext>
+            </a:extLst>
+          </p:cNvPr>
+          <p:cNvSpPr>
+            <a:spLocks noGrp="1"/>
+          </p:cNvSpPr>
+          <p:nvPr>
+            <p:ph type="sldNum" idx="12"/>
+          </p:nvPr>
+        </p:nvSpPr>
+        <p:spPr/>
+        <p:txBody>
+          <a:bodyPr/>
+          <a:lstStyle/>
+          <a:p>
+            <a:pPr marL="0" lvl="0" indent="0" algn="r" rtl="0">
+              <a:spcBef>
+                <a:spcPts val="0"/>
+              </a:spcBef>
+              <a:spcAft>
+                <a:spcPts val="0"/>
+              </a:spcAft>
+              <a:buNone/>
+            </a:pPr>
+            <a:fld id="{00000000-1234-1234-1234-123412341234}" type="slidenum">
+              <a:rPr lang="de-AT" smtClean="0"/>
+              <a:t>2</a:t>
+            </a:fld>
+            <a:endParaRPr lang="de-AT"/>
+          </a:p>
+        </p:txBody>
+      </p:sp>
+    </p:spTree>
+    <p:extLst>
+      <p:ext uri="{BB962C8B-B14F-4D97-AF65-F5344CB8AC3E}">
+        <p14:creationId xmlns:p14="http://schemas.microsoft.com/office/powerpoint/2010/main" val="1469461542"/>
+      </p:ext>
+    </p:extLst>
+  </p:cSld>
+  <p:clrMapOvr>
+    <a:masterClrMapping/>
+  </p:clrMapOvr>
+</p:sld>
+</file>
+
+<file path=ppt/slides/slide3.xml><?xml version="1.0" encoding="utf-8"?>
+<p:sld xmlns:a="http://schemas.openxmlformats.org/drawingml/2006/main" xmlns:r="http://schemas.openxmlformats.org/officeDocument/2006/relationships" xmlns:p="http://schemas.openxmlformats.org/presentationml/2006/main">
+  <p:cSld>
+    <p:spTree>
+      <p:nvGrpSpPr>
+        <p:cNvPr id="1" name=""/>
+        <p:cNvGrpSpPr/>
+        <p:nvPr/>
+      </p:nvGrpSpPr>
+      <p:grpSpPr>
+        <a:xfrm>
+          <a:off x="0" y="0"/>
+          <a:ext cx="0" cy="0"/>
+          <a:chOff x="0" y="0"/>
+          <a:chExt cx="0" cy="0"/>
+        </a:xfrm>
+      </p:grpSpPr>
+      <p:sp>
+        <p:nvSpPr>
+          <p:cNvPr id="2" name="Titel 1">
+            <a:extLst>
+              <a:ext uri="{FF2B5EF4-FFF2-40B4-BE49-F238E27FC236}">
+                <a16:creationId xmlns:a16="http://schemas.microsoft.com/office/drawing/2014/main" id="{B4838495-AE2B-42A5-82EC-E020CE7F2075}"/>
+              </a:ext>
+            </a:extLst>
+          </p:cNvPr>
+          <p:cNvSpPr>
+            <a:spLocks noGrp="1"/>
+          </p:cNvSpPr>
+          <p:nvPr>
+            <p:ph type="title"/>
+          </p:nvPr>
+        </p:nvSpPr>
+        <p:spPr/>
+        <p:txBody>
+          <a:bodyPr/>
+          <a:lstStyle/>
+          <a:p>
+            <a:r>
+              <a:rPr lang="de-AT" dirty="0"/>
+              <a:t>Motivation</a:t>
+            </a:r>
+          </a:p>
+        </p:txBody>
+      </p:sp>
+      <p:sp>
+        <p:nvSpPr>
+          <p:cNvPr id="3" name="Textplatzhalter 2">
+            <a:extLst>
+              <a:ext uri="{FF2B5EF4-FFF2-40B4-BE49-F238E27FC236}">
+                <a16:creationId xmlns:a16="http://schemas.microsoft.com/office/drawing/2014/main" id="{8616CF9A-1361-469B-B920-952A646BC381}"/>
+              </a:ext>
+            </a:extLst>
+          </p:cNvPr>
+          <p:cNvSpPr>
+            <a:spLocks noGrp="1"/>
+          </p:cNvSpPr>
+          <p:nvPr>
+            <p:ph type="body" idx="1"/>
+          </p:nvPr>
+        </p:nvSpPr>
+        <p:spPr/>
+        <p:txBody>
+          <a:bodyPr/>
+          <a:lstStyle/>
+          <a:p>
+            <a:endParaRPr lang="de-AT" dirty="0"/>
+          </a:p>
+        </p:txBody>
+      </p:sp>
+      <p:sp>
+        <p:nvSpPr>
+          <p:cNvPr id="4" name="Foliennummernplatzhalter 3">
+            <a:extLst>
+              <a:ext uri="{FF2B5EF4-FFF2-40B4-BE49-F238E27FC236}">
+                <a16:creationId xmlns:a16="http://schemas.microsoft.com/office/drawing/2014/main" id="{ABC673F0-FA04-474E-8CCD-CC331C80D7D6}"/>
+              </a:ext>
+            </a:extLst>
+          </p:cNvPr>
+          <p:cNvSpPr>
+            <a:spLocks noGrp="1"/>
+          </p:cNvSpPr>
+          <p:nvPr>
+            <p:ph type="sldNum" idx="12"/>
+          </p:nvPr>
+        </p:nvSpPr>
+        <p:spPr/>
+        <p:txBody>
+          <a:bodyPr/>
+          <a:lstStyle/>
+          <a:p>
+            <a:pPr marL="0" lvl="0" indent="0" algn="r" rtl="0">
+              <a:spcBef>
+                <a:spcPts val="0"/>
+              </a:spcBef>
+              <a:spcAft>
+                <a:spcPts val="0"/>
+              </a:spcAft>
+              <a:buNone/>
+            </a:pPr>
+            <a:fld id="{00000000-1234-1234-1234-123412341234}" type="slidenum">
+              <a:rPr lang="de-AT" smtClean="0"/>
+              <a:t>3</a:t>
+            </a:fld>
+            <a:endParaRPr lang="de-AT"/>
+          </a:p>
+        </p:txBody>
+      </p:sp>
+    </p:spTree>
+    <p:extLst>
+      <p:ext uri="{BB962C8B-B14F-4D97-AF65-F5344CB8AC3E}">
+        <p14:creationId xmlns:p14="http://schemas.microsoft.com/office/powerpoint/2010/main" val="2891266071"/>
+      </p:ext>
+    </p:extLst>
+  </p:cSld>
+  <p:clrMapOvr>
+    <a:masterClrMapping/>
+  </p:clrMapOvr>
+</p:sld>
+</file>
+
+<file path=ppt/slides/slide4.xml><?xml version="1.0" encoding="utf-8"?>
+<p:sld xmlns:a="http://schemas.openxmlformats.org/drawingml/2006/main" xmlns:r="http://schemas.openxmlformats.org/officeDocument/2006/relationships" xmlns:p="http://schemas.openxmlformats.org/presentationml/2006/main">
+  <p:cSld>
+    <p:spTree>
+      <p:nvGrpSpPr>
+        <p:cNvPr id="1" name=""/>
+        <p:cNvGrpSpPr/>
+        <p:nvPr/>
+      </p:nvGrpSpPr>
+      <p:grpSpPr>
+        <a:xfrm>
+          <a:off x="0" y="0"/>
+          <a:ext cx="0" cy="0"/>
+          <a:chOff x="0" y="0"/>
+          <a:chExt cx="0" cy="0"/>
+        </a:xfrm>
+      </p:grpSpPr>
+      <p:sp>
+        <p:nvSpPr>
+          <p:cNvPr id="2" name="Titel 1">
+            <a:extLst>
+              <a:ext uri="{FF2B5EF4-FFF2-40B4-BE49-F238E27FC236}">
+                <a16:creationId xmlns:a16="http://schemas.microsoft.com/office/drawing/2014/main" id="{40875E68-E68A-442D-AF35-E2BC0D9D65DE}"/>
+              </a:ext>
+            </a:extLst>
+          </p:cNvPr>
+          <p:cNvSpPr>
+            <a:spLocks noGrp="1"/>
+          </p:cNvSpPr>
+          <p:nvPr>
+            <p:ph type="title"/>
+          </p:nvPr>
+        </p:nvSpPr>
+        <p:spPr/>
+        <p:txBody>
+          <a:bodyPr/>
+          <a:lstStyle/>
+          <a:p>
+            <a:r>
+              <a:rPr lang="de-AT" dirty="0"/>
+              <a:t>Verwandte Patterns</a:t>
+            </a:r>
+          </a:p>
+        </p:txBody>
+      </p:sp>
+      <p:sp>
+        <p:nvSpPr>
+          <p:cNvPr id="3" name="Textplatzhalter 2">
+            <a:extLst>
+              <a:ext uri="{FF2B5EF4-FFF2-40B4-BE49-F238E27FC236}">
+                <a16:creationId xmlns:a16="http://schemas.microsoft.com/office/drawing/2014/main" id="{BC361956-4A3D-414C-9AD0-0A3298AA9483}"/>
+              </a:ext>
+            </a:extLst>
+          </p:cNvPr>
+          <p:cNvSpPr>
+            <a:spLocks noGrp="1"/>
+          </p:cNvSpPr>
+          <p:nvPr>
+            <p:ph type="body" idx="1"/>
+          </p:nvPr>
+        </p:nvSpPr>
+        <p:spPr/>
+        <p:txBody>
+          <a:bodyPr/>
+          <a:lstStyle/>
+          <a:p>
+            <a:r>
+              <a:rPr lang="de-AT" dirty="0"/>
+              <a:t>Abstract Factory Klassen sind implementiert durch</a:t>
+            </a:r>
+          </a:p>
+          <a:p>
+            <a:pPr lvl="1"/>
+            <a:r>
+              <a:rPr lang="de-AT" dirty="0"/>
+              <a:t>Factory Method</a:t>
+            </a:r>
+          </a:p>
+          <a:p>
+            <a:pPr lvl="1"/>
+            <a:r>
+              <a:rPr lang="de-AT" dirty="0"/>
+              <a:t>Prototype</a:t>
+            </a:r>
+          </a:p>
+          <a:p>
+            <a:r>
+              <a:rPr lang="de-AT" dirty="0"/>
+              <a:t>Konkrete Factory Klassen </a:t>
+            </a:r>
+            <a:r>
+              <a:rPr lang="de-AT" dirty="0">
+                <a:sym typeface="Wingdings" panose="05000000000000000000" pitchFamily="2" charset="2"/>
+              </a:rPr>
+              <a:t> Singleton</a:t>
+            </a:r>
+            <a:endParaRPr lang="de-AT" dirty="0"/>
+          </a:p>
+        </p:txBody>
+      </p:sp>
+      <p:sp>
+        <p:nvSpPr>
+          <p:cNvPr id="4" name="Foliennummernplatzhalter 3">
+            <a:extLst>
+              <a:ext uri="{FF2B5EF4-FFF2-40B4-BE49-F238E27FC236}">
+                <a16:creationId xmlns:a16="http://schemas.microsoft.com/office/drawing/2014/main" id="{ABD3712E-4C05-42BC-9134-315D50E10DB1}"/>
+              </a:ext>
+            </a:extLst>
+          </p:cNvPr>
+          <p:cNvSpPr>
+            <a:spLocks noGrp="1"/>
+          </p:cNvSpPr>
+          <p:nvPr>
+            <p:ph type="sldNum" idx="12"/>
+          </p:nvPr>
+        </p:nvSpPr>
+        <p:spPr/>
+        <p:txBody>
+          <a:bodyPr/>
+          <a:lstStyle/>
+          <a:p>
+            <a:pPr marL="0" lvl="0" indent="0" algn="r" rtl="0">
+              <a:spcBef>
+                <a:spcPts val="0"/>
+              </a:spcBef>
+              <a:spcAft>
+                <a:spcPts val="0"/>
+              </a:spcAft>
+              <a:buNone/>
+            </a:pPr>
+            <a:fld id="{00000000-1234-1234-1234-123412341234}" type="slidenum">
+              <a:rPr lang="de-AT" smtClean="0"/>
+              <a:t>4</a:t>
+            </a:fld>
+            <a:endParaRPr lang="de-AT"/>
+          </a:p>
+        </p:txBody>
+      </p:sp>
+    </p:spTree>
+    <p:extLst>
+      <p:ext uri="{BB962C8B-B14F-4D97-AF65-F5344CB8AC3E}">
+        <p14:creationId xmlns:p14="http://schemas.microsoft.com/office/powerpoint/2010/main" val="4097561737"/>
+      </p:ext>
+    </p:extLst>
+  </p:cSld>
+  <p:clrMapOvr>
+    <a:masterClrMapping/>
+  </p:clrMapOvr>
+</p:sld>
+</file>
+
+<file path=ppt/slides/slide5.xml><?xml version="1.0" encoding="utf-8"?>
+<p:sld xmlns:a="http://schemas.openxmlformats.org/drawingml/2006/main" xmlns:r="http://schemas.openxmlformats.org/officeDocument/2006/relationships" xmlns:p="http://schemas.openxmlformats.org/presentationml/2006/main">
+  <p:cSld>
+    <p:spTree>
+      <p:nvGrpSpPr>
+        <p:cNvPr id="1" name=""/>
+        <p:cNvGrpSpPr/>
+        <p:nvPr/>
+      </p:nvGrpSpPr>
+      <p:grpSpPr>
+        <a:xfrm>
+          <a:off x="0" y="0"/>
+          <a:ext cx="0" cy="0"/>
+          <a:chOff x="0" y="0"/>
+          <a:chExt cx="0" cy="0"/>
+        </a:xfrm>
+      </p:grpSpPr>
+      <p:sp>
+        <p:nvSpPr>
+          <p:cNvPr id="2" name="Titel 1">
+            <a:extLst>
+              <a:ext uri="{FF2B5EF4-FFF2-40B4-BE49-F238E27FC236}">
+                <a16:creationId xmlns:a16="http://schemas.microsoft.com/office/drawing/2014/main" id="{B82BAB24-EBB5-4D52-9831-0F04BDE79E83}"/>
+              </a:ext>
+            </a:extLst>
+          </p:cNvPr>
+          <p:cNvSpPr>
+            <a:spLocks noGrp="1"/>
+          </p:cNvSpPr>
+          <p:nvPr>
+            <p:ph type="title"/>
+          </p:nvPr>
+        </p:nvSpPr>
+        <p:spPr/>
+        <p:txBody>
+          <a:bodyPr/>
+          <a:lstStyle/>
+          <a:p>
+            <a:r>
+              <a:rPr lang="de-AT" dirty="0"/>
+              <a:t>Anwendungsfälle des Patterns</a:t>
+            </a:r>
+          </a:p>
+        </p:txBody>
+      </p:sp>
+      <p:sp>
+        <p:nvSpPr>
+          <p:cNvPr id="3" name="Textplatzhalter 2">
+            <a:extLst>
+              <a:ext uri="{FF2B5EF4-FFF2-40B4-BE49-F238E27FC236}">
+                <a16:creationId xmlns:a16="http://schemas.microsoft.com/office/drawing/2014/main" id="{A3745C45-C1CA-4D7A-B583-DF5921006BB9}"/>
+              </a:ext>
+            </a:extLst>
+          </p:cNvPr>
+          <p:cNvSpPr>
+            <a:spLocks noGrp="1"/>
+          </p:cNvSpPr>
+          <p:nvPr>
+            <p:ph type="body" idx="1"/>
+          </p:nvPr>
+        </p:nvSpPr>
+        <p:spPr/>
+        <p:txBody>
+          <a:bodyPr/>
+          <a:lstStyle/>
+          <a:p>
+            <a:r>
+              <a:rPr lang="de-AT" dirty="0"/>
+              <a:t>System unabhängig von der</a:t>
+            </a:r>
+          </a:p>
+          <a:p>
+            <a:pPr lvl="1"/>
+            <a:r>
+              <a:rPr lang="de-AT" dirty="0"/>
+              <a:t>Erzeugung</a:t>
+            </a:r>
+          </a:p>
+          <a:p>
+            <a:pPr lvl="1"/>
+            <a:r>
+              <a:rPr lang="de-AT" dirty="0"/>
+              <a:t>Zusammenstellung</a:t>
+            </a:r>
+          </a:p>
+          <a:p>
+            <a:pPr lvl="1"/>
+            <a:r>
+              <a:rPr lang="de-AT" dirty="0"/>
+              <a:t>Darstellung seiner Objekte</a:t>
+            </a:r>
+          </a:p>
+          <a:p>
+            <a:r>
+              <a:rPr lang="de-AT" dirty="0"/>
+              <a:t>Gruppe von ähnlichen Objekten, die gemeinsam benutzt werden</a:t>
+            </a:r>
+          </a:p>
+          <a:p>
+            <a:r>
+              <a:rPr lang="de-AT" dirty="0"/>
+              <a:t>Bereitstellung einer Klassenbibliothek</a:t>
+            </a:r>
+          </a:p>
+          <a:p>
+            <a:pPr lvl="1"/>
+            <a:r>
+              <a:rPr lang="de-AT" dirty="0"/>
+              <a:t>Öffentliche Interfaces</a:t>
+            </a:r>
+          </a:p>
+          <a:p>
+            <a:pPr lvl="1"/>
+            <a:r>
+              <a:rPr lang="de-AT" dirty="0"/>
+              <a:t>Private Implementierungen</a:t>
+            </a:r>
+          </a:p>
+        </p:txBody>
+      </p:sp>
+      <p:sp>
+        <p:nvSpPr>
+          <p:cNvPr id="4" name="Foliennummernplatzhalter 3">
+            <a:extLst>
+              <a:ext uri="{FF2B5EF4-FFF2-40B4-BE49-F238E27FC236}">
+                <a16:creationId xmlns:a16="http://schemas.microsoft.com/office/drawing/2014/main" id="{78E4C2EF-71CD-4D94-9986-3099097DF332}"/>
+              </a:ext>
+            </a:extLst>
+          </p:cNvPr>
+          <p:cNvSpPr>
+            <a:spLocks noGrp="1"/>
+          </p:cNvSpPr>
+          <p:nvPr>
+            <p:ph type="sldNum" idx="12"/>
+          </p:nvPr>
+        </p:nvSpPr>
+        <p:spPr/>
+        <p:txBody>
+          <a:bodyPr/>
+          <a:lstStyle/>
+          <a:p>
+            <a:pPr marL="0" lvl="0" indent="0" algn="r" rtl="0">
+              <a:spcBef>
+                <a:spcPts val="0"/>
+              </a:spcBef>
+              <a:spcAft>
+                <a:spcPts val="0"/>
+              </a:spcAft>
+              <a:buNone/>
+            </a:pPr>
+            <a:fld id="{00000000-1234-1234-1234-123412341234}" type="slidenum">
+              <a:rPr lang="de-AT" smtClean="0"/>
+              <a:t>5</a:t>
+            </a:fld>
+            <a:endParaRPr lang="de-AT"/>
+          </a:p>
+        </p:txBody>
+      </p:sp>
+    </p:spTree>
+    <p:extLst>
+      <p:ext uri="{BB962C8B-B14F-4D97-AF65-F5344CB8AC3E}">
+        <p14:creationId xmlns:p14="http://schemas.microsoft.com/office/powerpoint/2010/main" val="3423937519"/>
+      </p:ext>
+    </p:extLst>
+  </p:cSld>
+  <p:clrMapOvr>
+    <a:masterClrMapping/>
+  </p:clrMapOvr>
+</p:sld>
+</file>
+
+<file path=ppt/slides/slide6.xml><?xml version="1.0" encoding="utf-8"?>
+<p:sld xmlns:a="http://schemas.openxmlformats.org/drawingml/2006/main" xmlns:r="http://schemas.openxmlformats.org/officeDocument/2006/relationships" xmlns:p="http://schemas.openxmlformats.org/presentationml/2006/main">
+  <p:cSld>
+    <p:spTree>
+      <p:nvGrpSpPr>
+        <p:cNvPr id="1" name=""/>
+        <p:cNvGrpSpPr/>
+        <p:nvPr/>
+      </p:nvGrpSpPr>
+      <p:grpSpPr>
+        <a:xfrm>
+          <a:off x="0" y="0"/>
+          <a:ext cx="0" cy="0"/>
+          <a:chOff x="0" y="0"/>
+          <a:chExt cx="0" cy="0"/>
+        </a:xfrm>
+      </p:grpSpPr>
+      <p:sp>
+        <p:nvSpPr>
+          <p:cNvPr id="2" name="Titel 1">
+            <a:extLst>
+              <a:ext uri="{FF2B5EF4-FFF2-40B4-BE49-F238E27FC236}">
+                <a16:creationId xmlns:a16="http://schemas.microsoft.com/office/drawing/2014/main" id="{0035B0CE-D982-4EED-AA5D-9E5BD9841FA9}"/>
+              </a:ext>
+            </a:extLst>
+          </p:cNvPr>
+          <p:cNvSpPr>
+            <a:spLocks noGrp="1"/>
+          </p:cNvSpPr>
+          <p:nvPr>
+            <p:ph type="title"/>
+          </p:nvPr>
+        </p:nvSpPr>
+        <p:spPr/>
+        <p:txBody>
+          <a:bodyPr/>
+          <a:lstStyle/>
+          <a:p>
+            <a:r>
+              <a:rPr lang="de-AT" dirty="0"/>
+              <a:t>UML Diagramm vom Abstract Factory Pattern</a:t>
+            </a:r>
+          </a:p>
+        </p:txBody>
+      </p:sp>
+      <p:sp>
+        <p:nvSpPr>
+          <p:cNvPr id="3" name="Textplatzhalter 2">
+            <a:extLst>
+              <a:ext uri="{FF2B5EF4-FFF2-40B4-BE49-F238E27FC236}">
+                <a16:creationId xmlns:a16="http://schemas.microsoft.com/office/drawing/2014/main" id="{A94B7D30-D97F-4CEA-BD7C-E8BFDD26EDD0}"/>
+              </a:ext>
+            </a:extLst>
+          </p:cNvPr>
+          <p:cNvSpPr>
+            <a:spLocks noGrp="1"/>
+          </p:cNvSpPr>
+          <p:nvPr>
+            <p:ph type="body" idx="1"/>
+          </p:nvPr>
+        </p:nvSpPr>
+        <p:spPr>
+          <a:xfrm>
+            <a:off x="343225" y="1500000"/>
+            <a:ext cx="8290800" cy="4851900"/>
+          </a:xfrm>
+        </p:spPr>
+        <p:txBody>
+          <a:bodyPr/>
+          <a:lstStyle/>
+          <a:p>
+            <a:endParaRPr lang="de-AT" dirty="0"/>
+          </a:p>
+        </p:txBody>
+      </p:sp>
+      <p:sp>
+        <p:nvSpPr>
+          <p:cNvPr id="4" name="Foliennummernplatzhalter 3">
+            <a:extLst>
+              <a:ext uri="{FF2B5EF4-FFF2-40B4-BE49-F238E27FC236}">
+                <a16:creationId xmlns:a16="http://schemas.microsoft.com/office/drawing/2014/main" id="{A1F62717-5B76-45DB-A6FA-5D9370801E25}"/>
+              </a:ext>
+            </a:extLst>
+          </p:cNvPr>
+          <p:cNvSpPr>
+            <a:spLocks noGrp="1"/>
+          </p:cNvSpPr>
+          <p:nvPr>
+            <p:ph type="sldNum" idx="12"/>
+          </p:nvPr>
+        </p:nvSpPr>
+        <p:spPr/>
+        <p:txBody>
+          <a:bodyPr/>
+          <a:lstStyle/>
+          <a:p>
+            <a:pPr marL="0" lvl="0" indent="0" algn="r" rtl="0">
+              <a:spcBef>
+                <a:spcPts val="0"/>
+              </a:spcBef>
+              <a:spcAft>
+                <a:spcPts val="0"/>
+              </a:spcAft>
+              <a:buNone/>
+            </a:pPr>
+            <a:fld id="{00000000-1234-1234-1234-123412341234}" type="slidenum">
+              <a:rPr lang="de-AT" smtClean="0"/>
+              <a:t>6</a:t>
+            </a:fld>
+            <a:endParaRPr lang="de-AT"/>
+          </a:p>
+        </p:txBody>
+      </p:sp>
+      <p:pic>
+        <p:nvPicPr>
+          <p:cNvPr id="1026" name="Picture 2" descr="Bildergebnis fÃ¼r abstract factory uml">
+            <a:extLst>
+              <a:ext uri="{FF2B5EF4-FFF2-40B4-BE49-F238E27FC236}">
+                <a16:creationId xmlns:a16="http://schemas.microsoft.com/office/drawing/2014/main" id="{9B71F7EA-5123-4036-A6F5-F03C7883106B}"/>
+              </a:ext>
+            </a:extLst>
+          </p:cNvPr>
+          <p:cNvPicPr>
+            <a:picLocks noChangeAspect="1" noChangeArrowheads="1"/>
+          </p:cNvPicPr>
+          <p:nvPr/>
+        </p:nvPicPr>
+        <p:blipFill>
+          <a:blip r:embed="rId2">
+            <a:extLst>
+              <a:ext uri="{28A0092B-C50C-407E-A947-70E740481C1C}">
+                <a14:useLocalDpi xmlns:a14="http://schemas.microsoft.com/office/drawing/2010/main" val="0"/>
+              </a:ext>
+            </a:extLst>
+          </a:blip>
+          <a:srcRect/>
+          <a:stretch>
+            <a:fillRect/>
+          </a:stretch>
+        </p:blipFill>
+        <p:spPr bwMode="auto">
+          <a:xfrm>
+            <a:off x="1362326" y="1209842"/>
+            <a:ext cx="6313607" cy="5373529"/>
+          </a:xfrm>
+          <a:prstGeom prst="rect">
+            <a:avLst/>
+          </a:prstGeom>
+          <a:noFill/>
+          <a:extLst>
+            <a:ext uri="{909E8E84-426E-40DD-AFC4-6F175D3DCCD1}">
+              <a14:hiddenFill xmlns:a14="http://schemas.microsoft.com/office/drawing/2010/main">
+                <a:solidFill>
+                  <a:srgbClr val="FFFFFF"/>
+                </a:solidFill>
+              </a14:hiddenFill>
+            </a:ext>
+          </a:extLst>
+        </p:spPr>
+      </p:pic>
+    </p:spTree>
+    <p:extLst>
+      <p:ext uri="{BB962C8B-B14F-4D97-AF65-F5344CB8AC3E}">
+        <p14:creationId xmlns:p14="http://schemas.microsoft.com/office/powerpoint/2010/main" val="3322887412"/>
+      </p:ext>
+    </p:extLst>
+  </p:cSld>
+  <p:clrMapOvr>
+    <a:masterClrMapping/>
+  </p:clrMapOvr>
+</p:sld>
+</file>
+
+<file path=ppt/slides/slide7.xml><?xml version="1.0" encoding="utf-8"?>
+<p:sld xmlns:a="http://schemas.openxmlformats.org/drawingml/2006/main" xmlns:r="http://schemas.openxmlformats.org/officeDocument/2006/relationships" xmlns:p="http://schemas.openxmlformats.org/presentationml/2006/main">
+  <p:cSld>
+    <p:spTree>
+      <p:nvGrpSpPr>
+        <p:cNvPr id="1" name=""/>
+        <p:cNvGrpSpPr/>
+        <p:nvPr/>
+      </p:nvGrpSpPr>
+      <p:grpSpPr>
+        <a:xfrm>
+          <a:off x="0" y="0"/>
+          <a:ext cx="0" cy="0"/>
+          <a:chOff x="0" y="0"/>
+          <a:chExt cx="0" cy="0"/>
+        </a:xfrm>
+      </p:grpSpPr>
+      <p:sp>
+        <p:nvSpPr>
+          <p:cNvPr id="2" name="Titel 1">
+            <a:extLst>
+              <a:ext uri="{FF2B5EF4-FFF2-40B4-BE49-F238E27FC236}">
+                <a16:creationId xmlns:a16="http://schemas.microsoft.com/office/drawing/2014/main" id="{7B49886A-DBF8-4690-989A-AC6DC97DB377}"/>
+              </a:ext>
+            </a:extLst>
+          </p:cNvPr>
+          <p:cNvSpPr>
+            <a:spLocks noGrp="1"/>
+          </p:cNvSpPr>
+          <p:nvPr>
+            <p:ph type="title"/>
+          </p:nvPr>
+        </p:nvSpPr>
+        <p:spPr/>
+        <p:txBody>
+          <a:bodyPr/>
+          <a:lstStyle/>
+          <a:p>
+            <a:r>
+              <a:rPr lang="de-AT" dirty="0"/>
+              <a:t>Vorteile</a:t>
+            </a:r>
+          </a:p>
+        </p:txBody>
+      </p:sp>
+      <p:sp>
+        <p:nvSpPr>
+          <p:cNvPr id="3" name="Textplatzhalter 2">
+            <a:extLst>
+              <a:ext uri="{FF2B5EF4-FFF2-40B4-BE49-F238E27FC236}">
+                <a16:creationId xmlns:a16="http://schemas.microsoft.com/office/drawing/2014/main" id="{D8D7EF8A-8ECD-4E2A-970B-5A44EF7B8AD4}"/>
+              </a:ext>
+            </a:extLst>
+          </p:cNvPr>
+          <p:cNvSpPr>
+            <a:spLocks noGrp="1"/>
+          </p:cNvSpPr>
+          <p:nvPr>
+            <p:ph type="body" idx="1"/>
+          </p:nvPr>
+        </p:nvSpPr>
+        <p:spPr/>
+        <p:txBody>
+          <a:bodyPr/>
+          <a:lstStyle/>
+          <a:p>
+            <a:r>
+              <a:rPr lang="de-AT" dirty="0"/>
+              <a:t>Isolation der konkreten Klassen</a:t>
+            </a:r>
+          </a:p>
+          <a:p>
+            <a:pPr lvl="1"/>
+            <a:r>
+              <a:rPr lang="de-AT" dirty="0"/>
+              <a:t>Client überlässt Erstellung der Objekte der Factory</a:t>
+            </a:r>
+          </a:p>
+          <a:p>
+            <a:r>
+              <a:rPr lang="de-AT" dirty="0"/>
+              <a:t>Objekte können einfach ausgetauscht werden</a:t>
+            </a:r>
+          </a:p>
+          <a:p>
+            <a:pPr lvl="1"/>
+            <a:r>
+              <a:rPr lang="de-AT" dirty="0"/>
+              <a:t>Einfaches Tauschen der konkreten Factory</a:t>
+            </a:r>
+          </a:p>
+          <a:p>
+            <a:r>
+              <a:rPr lang="de-AT" dirty="0"/>
+              <a:t>Konsistenz der Objekte</a:t>
+            </a:r>
+          </a:p>
+          <a:p>
+            <a:pPr lvl="1"/>
+            <a:r>
+              <a:rPr lang="de-AT" dirty="0"/>
+              <a:t>Objekte der Factory sind so </a:t>
+            </a:r>
+            <a:r>
+              <a:rPr lang="de-AT" dirty="0" err="1"/>
+              <a:t>designed</a:t>
+            </a:r>
+            <a:r>
+              <a:rPr lang="de-AT" dirty="0"/>
+              <a:t>, um zusammenarbeiten zu können</a:t>
+            </a:r>
+          </a:p>
+        </p:txBody>
+      </p:sp>
+      <p:sp>
+        <p:nvSpPr>
+          <p:cNvPr id="4" name="Foliennummernplatzhalter 3">
+            <a:extLst>
+              <a:ext uri="{FF2B5EF4-FFF2-40B4-BE49-F238E27FC236}">
+                <a16:creationId xmlns:a16="http://schemas.microsoft.com/office/drawing/2014/main" id="{D8C10F95-DA02-4C33-AF21-D762AFC5142E}"/>
+              </a:ext>
+            </a:extLst>
+          </p:cNvPr>
+          <p:cNvSpPr>
+            <a:spLocks noGrp="1"/>
+          </p:cNvSpPr>
+          <p:nvPr>
+            <p:ph type="sldNum" idx="12"/>
+          </p:nvPr>
+        </p:nvSpPr>
+        <p:spPr/>
+        <p:txBody>
+          <a:bodyPr/>
+          <a:lstStyle/>
+          <a:p>
+            <a:pPr marL="0" lvl="0" indent="0" algn="r" rtl="0">
+              <a:spcBef>
+                <a:spcPts val="0"/>
+              </a:spcBef>
+              <a:spcAft>
+                <a:spcPts val="0"/>
+              </a:spcAft>
+              <a:buNone/>
+            </a:pPr>
+            <a:fld id="{00000000-1234-1234-1234-123412341234}" type="slidenum">
+              <a:rPr lang="de-AT" smtClean="0"/>
+              <a:t>7</a:t>
+            </a:fld>
+            <a:endParaRPr lang="de-AT"/>
+          </a:p>
+        </p:txBody>
+      </p:sp>
+    </p:spTree>
+    <p:extLst>
+      <p:ext uri="{BB962C8B-B14F-4D97-AF65-F5344CB8AC3E}">
+        <p14:creationId xmlns:p14="http://schemas.microsoft.com/office/powerpoint/2010/main" val="1415051504"/>
+      </p:ext>
+    </p:extLst>
+  </p:cSld>
+  <p:clrMapOvr>
+    <a:masterClrMapping/>
+  </p:clrMapOvr>
+</p:sld>
+</file>
+
+<file path=ppt/slides/slide8.xml><?xml version="1.0" encoding="utf-8"?>
+<p:sld xmlns:a="http://schemas.openxmlformats.org/drawingml/2006/main" xmlns:r="http://schemas.openxmlformats.org/officeDocument/2006/relationships" xmlns:p="http://schemas.openxmlformats.org/presentationml/2006/main">
+  <p:cSld>
+    <p:spTree>
+      <p:nvGrpSpPr>
+        <p:cNvPr id="1" name=""/>
+        <p:cNvGrpSpPr/>
+        <p:nvPr/>
+      </p:nvGrpSpPr>
+      <p:grpSpPr>
+        <a:xfrm>
+          <a:off x="0" y="0"/>
+          <a:ext cx="0" cy="0"/>
+          <a:chOff x="0" y="0"/>
+          <a:chExt cx="0" cy="0"/>
+        </a:xfrm>
+      </p:grpSpPr>
+      <p:sp>
+        <p:nvSpPr>
+          <p:cNvPr id="2" name="Titel 1">
+            <a:extLst>
+              <a:ext uri="{FF2B5EF4-FFF2-40B4-BE49-F238E27FC236}">
+                <a16:creationId xmlns:a16="http://schemas.microsoft.com/office/drawing/2014/main" id="{1266ED8F-9FD1-4B15-A50E-C6F18D83F3DC}"/>
+              </a:ext>
+            </a:extLst>
+          </p:cNvPr>
+          <p:cNvSpPr>
+            <a:spLocks noGrp="1"/>
+          </p:cNvSpPr>
+          <p:nvPr>
+            <p:ph type="title"/>
+          </p:nvPr>
+        </p:nvSpPr>
+        <p:spPr/>
+        <p:txBody>
+          <a:bodyPr/>
+          <a:lstStyle/>
+          <a:p>
+            <a:r>
+              <a:rPr lang="de-AT" dirty="0"/>
+              <a:t>Nachteile</a:t>
+            </a:r>
+          </a:p>
+        </p:txBody>
+      </p:sp>
+      <p:sp>
+        <p:nvSpPr>
+          <p:cNvPr id="3" name="Textplatzhalter 2">
+            <a:extLst>
+              <a:ext uri="{FF2B5EF4-FFF2-40B4-BE49-F238E27FC236}">
+                <a16:creationId xmlns:a16="http://schemas.microsoft.com/office/drawing/2014/main" id="{DFA52D6C-B921-4B1B-9E4C-1FE88A947AF5}"/>
+              </a:ext>
+            </a:extLst>
+          </p:cNvPr>
+          <p:cNvSpPr>
+            <a:spLocks noGrp="1"/>
+          </p:cNvSpPr>
+          <p:nvPr>
+            <p:ph type="body" idx="1"/>
+          </p:nvPr>
+        </p:nvSpPr>
+        <p:spPr/>
+        <p:txBody>
+          <a:bodyPr/>
+          <a:lstStyle/>
+          <a:p>
+            <a:r>
+              <a:rPr lang="de-AT" dirty="0"/>
+              <a:t>Erweiterbarkeit aufwändig</a:t>
+            </a:r>
+          </a:p>
+          <a:p>
+            <a:pPr lvl="1"/>
+            <a:r>
+              <a:rPr lang="de-AT" dirty="0"/>
+              <a:t>Anpassung von</a:t>
+            </a:r>
+          </a:p>
+          <a:p>
+            <a:pPr lvl="2"/>
+            <a:r>
+              <a:rPr lang="de-AT" dirty="0"/>
+              <a:t>Abstract Factory</a:t>
+            </a:r>
+          </a:p>
+          <a:p>
+            <a:pPr lvl="2"/>
+            <a:r>
+              <a:rPr lang="de-AT" dirty="0"/>
+              <a:t>Interface</a:t>
+            </a:r>
+          </a:p>
+          <a:p>
+            <a:pPr lvl="2"/>
+            <a:r>
+              <a:rPr lang="de-AT" dirty="0"/>
+              <a:t>Subklassen</a:t>
+            </a:r>
+          </a:p>
+          <a:p>
+            <a:r>
+              <a:rPr lang="de-AT" dirty="0"/>
+              <a:t>Lesbarkeit erschwert</a:t>
+            </a:r>
+          </a:p>
+          <a:p>
+            <a:pPr lvl="1"/>
+            <a:r>
+              <a:rPr lang="de-AT" dirty="0"/>
+              <a:t>Code hinter Abstraktion</a:t>
+            </a:r>
+          </a:p>
+          <a:p>
+            <a:r>
+              <a:rPr lang="de-AT" dirty="0"/>
+              <a:t>„Anti-pattern“ bei falscher Nutzung</a:t>
+            </a:r>
+          </a:p>
+          <a:p>
+            <a:pPr lvl="1"/>
+            <a:r>
+              <a:rPr lang="de-AT" dirty="0"/>
+              <a:t>Sogenanntes Bad-</a:t>
+            </a:r>
+            <a:r>
+              <a:rPr lang="de-AT" dirty="0" err="1"/>
+              <a:t>Programming</a:t>
+            </a:r>
+            <a:r>
+              <a:rPr lang="de-AT" dirty="0"/>
+              <a:t>-Practice</a:t>
+            </a:r>
+          </a:p>
+          <a:p>
+            <a:pPr lvl="1"/>
+            <a:r>
+              <a:rPr lang="de-AT" dirty="0"/>
+              <a:t>OOP </a:t>
+            </a:r>
+            <a:r>
+              <a:rPr lang="de-AT" dirty="0">
+                <a:sym typeface="Wingdings" panose="05000000000000000000" pitchFamily="2" charset="2"/>
+              </a:rPr>
+              <a:t> Aufteilung | Anti-pattern  Ein Objekt, das alle Aufgaben übernimmt</a:t>
+            </a:r>
+            <a:endParaRPr lang="de-AT" dirty="0"/>
+          </a:p>
+        </p:txBody>
+      </p:sp>
+      <p:sp>
+        <p:nvSpPr>
+          <p:cNvPr id="4" name="Foliennummernplatzhalter 3">
+            <a:extLst>
+              <a:ext uri="{FF2B5EF4-FFF2-40B4-BE49-F238E27FC236}">
+                <a16:creationId xmlns:a16="http://schemas.microsoft.com/office/drawing/2014/main" id="{F77D36DB-8BF3-4723-816E-08B35346E047}"/>
+              </a:ext>
+            </a:extLst>
+          </p:cNvPr>
+          <p:cNvSpPr>
+            <a:spLocks noGrp="1"/>
+          </p:cNvSpPr>
+          <p:nvPr>
+            <p:ph type="sldNum" idx="12"/>
+          </p:nvPr>
+        </p:nvSpPr>
+        <p:spPr/>
+        <p:txBody>
+          <a:bodyPr/>
+          <a:lstStyle/>
+          <a:p>
+            <a:pPr marL="0" lvl="0" indent="0" algn="r" rtl="0">
+              <a:spcBef>
+                <a:spcPts val="0"/>
+              </a:spcBef>
+              <a:spcAft>
+                <a:spcPts val="0"/>
+              </a:spcAft>
+              <a:buNone/>
+            </a:pPr>
+            <a:fld id="{00000000-1234-1234-1234-123412341234}" type="slidenum">
+              <a:rPr lang="de-AT" smtClean="0"/>
+              <a:t>8</a:t>
+            </a:fld>
+            <a:endParaRPr lang="de-AT"/>
+          </a:p>
+        </p:txBody>
+      </p:sp>
+    </p:spTree>
+    <p:extLst>
+      <p:ext uri="{BB962C8B-B14F-4D97-AF65-F5344CB8AC3E}">
+        <p14:creationId xmlns:p14="http://schemas.microsoft.com/office/powerpoint/2010/main" val="471742731"/>
+      </p:ext>
+    </p:extLst>
+  </p:cSld>
+  <p:clrMapOvr>
+    <a:masterClrMapping/>
+  </p:clrMapOvr>
+</p:sld>
+</file>
+
+<file path=ppt/slides/slide9.xml><?xml version="1.0" encoding="utf-8"?>
+<p:sld xmlns:a="http://schemas.openxmlformats.org/drawingml/2006/main" xmlns:r="http://schemas.openxmlformats.org/officeDocument/2006/relationships" xmlns:p="http://schemas.openxmlformats.org/presentationml/2006/main">
+  <p:cSld>
+    <p:spTree>
+      <p:nvGrpSpPr>
+        <p:cNvPr id="1" name=""/>
+        <p:cNvGrpSpPr/>
+        <p:nvPr/>
+      </p:nvGrpSpPr>
+      <p:grpSpPr>
+        <a:xfrm>
+          <a:off x="0" y="0"/>
+          <a:ext cx="0" cy="0"/>
+          <a:chOff x="0" y="0"/>
+          <a:chExt cx="0" cy="0"/>
+        </a:xfrm>
+      </p:grpSpPr>
+      <p:sp>
+        <p:nvSpPr>
+          <p:cNvPr id="2" name="Titel 1">
+            <a:extLst>
+              <a:ext uri="{FF2B5EF4-FFF2-40B4-BE49-F238E27FC236}">
+                <a16:creationId xmlns:a16="http://schemas.microsoft.com/office/drawing/2014/main" id="{D41FDE6F-1199-4939-A35E-221AD97B2904}"/>
+              </a:ext>
+            </a:extLst>
+          </p:cNvPr>
+          <p:cNvSpPr>
+            <a:spLocks noGrp="1"/>
+          </p:cNvSpPr>
+          <p:nvPr>
+            <p:ph type="title"/>
+          </p:nvPr>
+        </p:nvSpPr>
+        <p:spPr/>
+        <p:txBody>
+          <a:bodyPr/>
+          <a:lstStyle/>
+          <a:p>
+            <a:r>
+              <a:rPr lang="de-AT" dirty="0"/>
+              <a:t>Unterschied Factory – Abstract Factory</a:t>
+            </a:r>
+          </a:p>
+        </p:txBody>
+      </p:sp>
+      <p:sp>
+        <p:nvSpPr>
+          <p:cNvPr id="3" name="Textplatzhalter 2">
+            <a:extLst>
+              <a:ext uri="{FF2B5EF4-FFF2-40B4-BE49-F238E27FC236}">
+                <a16:creationId xmlns:a16="http://schemas.microsoft.com/office/drawing/2014/main" id="{DDB95B27-E905-4254-A544-863FCDEB7951}"/>
+              </a:ext>
+            </a:extLst>
+          </p:cNvPr>
+          <p:cNvSpPr>
+            <a:spLocks noGrp="1"/>
+          </p:cNvSpPr>
+          <p:nvPr>
+            <p:ph type="body" idx="1"/>
+          </p:nvPr>
+        </p:nvSpPr>
+        <p:spPr/>
+        <p:txBody>
+          <a:bodyPr/>
+          <a:lstStyle/>
+          <a:p>
+            <a:r>
+              <a:rPr lang="de-AT" sz="2000" dirty="0"/>
+              <a:t>Factory Methode &lt;-&gt; Abstract Factory Klasse</a:t>
+            </a:r>
+          </a:p>
+          <a:p>
+            <a:r>
+              <a:rPr lang="de-AT" sz="2000" dirty="0"/>
+              <a:t>Factory Methode kann von Subklassen überschrieben werden</a:t>
+            </a:r>
+          </a:p>
+          <a:p>
+            <a:r>
+              <a:rPr lang="de-AT" sz="2000" dirty="0"/>
+              <a:t>Abstract Factory überträgt Verantwortung der Objektinitialisierung an Subklassen</a:t>
+            </a:r>
+          </a:p>
+          <a:p>
+            <a:endParaRPr lang="de-AT" sz="2000" dirty="0"/>
+          </a:p>
+          <a:p>
+            <a:endParaRPr lang="de-AT" dirty="0"/>
+          </a:p>
+          <a:p>
+            <a:endParaRPr lang="de-AT" dirty="0"/>
+          </a:p>
+        </p:txBody>
+      </p:sp>
+      <p:sp>
+        <p:nvSpPr>
+          <p:cNvPr id="4" name="Foliennummernplatzhalter 3">
+            <a:extLst>
+              <a:ext uri="{FF2B5EF4-FFF2-40B4-BE49-F238E27FC236}">
+                <a16:creationId xmlns:a16="http://schemas.microsoft.com/office/drawing/2014/main" id="{1497F17A-C212-465A-825C-43FF334B66D9}"/>
+              </a:ext>
+            </a:extLst>
+          </p:cNvPr>
+          <p:cNvSpPr>
+            <a:spLocks noGrp="1"/>
+          </p:cNvSpPr>
+          <p:nvPr>
+            <p:ph type="sldNum" idx="12"/>
+          </p:nvPr>
+        </p:nvSpPr>
+        <p:spPr/>
+        <p:txBody>
+          <a:bodyPr/>
+          <a:lstStyle/>
+          <a:p>
+            <a:pPr marL="0" lvl="0" indent="0" algn="r" rtl="0">
+              <a:spcBef>
+                <a:spcPts val="0"/>
+              </a:spcBef>
+              <a:spcAft>
+                <a:spcPts val="0"/>
+              </a:spcAft>
+              <a:buNone/>
+            </a:pPr>
+            <a:fld id="{00000000-1234-1234-1234-123412341234}" type="slidenum">
+              <a:rPr lang="de-AT" smtClean="0"/>
+              <a:t>9</a:t>
+            </a:fld>
+            <a:endParaRPr lang="de-AT"/>
+          </a:p>
+        </p:txBody>
+      </p:sp>
+    </p:spTree>
+    <p:extLst>
+      <p:ext uri="{BB962C8B-B14F-4D97-AF65-F5344CB8AC3E}">
+        <p14:creationId xmlns:p14="http://schemas.microsoft.com/office/powerpoint/2010/main" val="310389490"/>
       </p:ext>
     </p:extLst>
   </p:cSld>

</xml_diff>